<commit_message>
Finalized lecture 8 and homework
</commit_message>
<xml_diff>
--- a/bin/survival lecture 8.pptx
+++ b/bin/survival lecture 8.pptx
@@ -5,10 +5,10 @@
     <p:sldMasterId id="2147483664" r:id="rId1"/>
   </p:sldMasterIdLst>
   <p:notesMasterIdLst>
-    <p:notesMasterId r:id="rId55"/>
+    <p:notesMasterId r:id="rId60"/>
   </p:notesMasterIdLst>
   <p:handoutMasterIdLst>
-    <p:handoutMasterId r:id="rId56"/>
+    <p:handoutMasterId r:id="rId61"/>
   </p:handoutMasterIdLst>
   <p:sldIdLst>
     <p:sldId id="256" r:id="rId2"/>
@@ -57,13 +57,18 @@
     <p:sldId id="430" r:id="rId45"/>
     <p:sldId id="431" r:id="rId46"/>
     <p:sldId id="432" r:id="rId47"/>
-    <p:sldId id="434" r:id="rId48"/>
-    <p:sldId id="435" r:id="rId49"/>
-    <p:sldId id="436" r:id="rId50"/>
-    <p:sldId id="437" r:id="rId51"/>
-    <p:sldId id="438" r:id="rId52"/>
-    <p:sldId id="439" r:id="rId53"/>
-    <p:sldId id="342" r:id="rId54"/>
+    <p:sldId id="440" r:id="rId48"/>
+    <p:sldId id="441" r:id="rId49"/>
+    <p:sldId id="442" r:id="rId50"/>
+    <p:sldId id="434" r:id="rId51"/>
+    <p:sldId id="435" r:id="rId52"/>
+    <p:sldId id="436" r:id="rId53"/>
+    <p:sldId id="437" r:id="rId54"/>
+    <p:sldId id="438" r:id="rId55"/>
+    <p:sldId id="439" r:id="rId56"/>
+    <p:sldId id="443" r:id="rId57"/>
+    <p:sldId id="444" r:id="rId58"/>
+    <p:sldId id="342" r:id="rId59"/>
   </p:sldIdLst>
   <p:sldSz cx="9144000" cy="6858000" type="screen4x3"/>
   <p:notesSz cx="9601200" cy="7315200"/>
@@ -380,7 +385,7 @@
               <a:pPr>
                 <a:defRPr/>
               </a:pPr>
-              <a:t>6/17/2018</a:t>
+              <a:t>6/18/2018</a:t>
             </a:fld>
             <a:endParaRPr lang="en-US" altLang="en-US"/>
           </a:p>
@@ -688,7 +693,7 @@
               <a:pPr>
                 <a:defRPr/>
               </a:pPr>
-              <a:t>6/17/2018</a:t>
+              <a:t>6/18/2018</a:t>
             </a:fld>
             <a:endParaRPr lang="en-US" altLang="en-US"/>
           </a:p>
@@ -10749,7 +10754,7 @@
           <a:p>
             <a:r>
               <a:rPr lang="en-US" dirty="0"/>
-              <a:t>The leader data set, competing risks</a:t>
+              <a:t>The competing risks model</a:t>
             </a:r>
           </a:p>
         </p:txBody>
@@ -10809,6 +10814,686 @@
                 <a:defRPr/>
               </a:pPr>
               <a:t>47</a:t>
+            </a:fld>
+            <a:endParaRPr lang="en-US"/>
+          </a:p>
+        </p:txBody>
+      </p:sp>
+      <p:pic>
+        <p:nvPicPr>
+          <p:cNvPr id="3" name="Picture 2">
+            <a:extLst>
+              <a:ext uri="{FF2B5EF4-FFF2-40B4-BE49-F238E27FC236}">
+                <a16:creationId xmlns:a16="http://schemas.microsoft.com/office/drawing/2014/main" id="{E32B5531-E311-4305-BC6A-2EC9F7252340}"/>
+              </a:ext>
+            </a:extLst>
+          </p:cNvPr>
+          <p:cNvPicPr>
+            <a:picLocks noChangeAspect="1"/>
+          </p:cNvPicPr>
+          <p:nvPr/>
+        </p:nvPicPr>
+        <p:blipFill>
+          <a:blip r:embed="rId2"/>
+          <a:stretch>
+            <a:fillRect/>
+          </a:stretch>
+        </p:blipFill>
+        <p:spPr>
+          <a:xfrm>
+            <a:off x="533400" y="1219200"/>
+            <a:ext cx="8285714" cy="2961905"/>
+          </a:xfrm>
+          <a:prstGeom prst="rect">
+            <a:avLst/>
+          </a:prstGeom>
+        </p:spPr>
+      </p:pic>
+    </p:spTree>
+    <p:extLst>
+      <p:ext uri="{BB962C8B-B14F-4D97-AF65-F5344CB8AC3E}">
+        <p14:creationId xmlns:p14="http://schemas.microsoft.com/office/powerpoint/2010/main" val="486885275"/>
+      </p:ext>
+    </p:extLst>
+  </p:cSld>
+  <p:clrMapOvr>
+    <a:masterClrMapping/>
+  </p:clrMapOvr>
+</p:sld>
+</file>
+
+<file path=ppt/slides/slide48.xml><?xml version="1.0" encoding="utf-8"?>
+<p:sld xmlns:a="http://schemas.openxmlformats.org/drawingml/2006/main" xmlns:r="http://schemas.openxmlformats.org/officeDocument/2006/relationships" xmlns:p="http://schemas.openxmlformats.org/presentationml/2006/main">
+  <p:cSld>
+    <p:spTree>
+      <p:nvGrpSpPr>
+        <p:cNvPr id="1" name=""/>
+        <p:cNvGrpSpPr/>
+        <p:nvPr/>
+      </p:nvGrpSpPr>
+      <p:grpSpPr>
+        <a:xfrm>
+          <a:off x="0" y="0"/>
+          <a:ext cx="0" cy="0"/>
+          <a:chOff x="0" y="0"/>
+          <a:chExt cx="0" cy="0"/>
+        </a:xfrm>
+      </p:grpSpPr>
+      <p:sp>
+        <p:nvSpPr>
+          <p:cNvPr id="2" name="Title 1"/>
+          <p:cNvSpPr>
+            <a:spLocks noGrp="1"/>
+          </p:cNvSpPr>
+          <p:nvPr>
+            <p:ph type="title"/>
+          </p:nvPr>
+        </p:nvSpPr>
+        <p:spPr/>
+        <p:txBody>
+          <a:bodyPr/>
+          <a:lstStyle/>
+          <a:p>
+            <a:r>
+              <a:rPr lang="en-US" dirty="0"/>
+              <a:t>The competing risks model</a:t>
+            </a:r>
+          </a:p>
+        </p:txBody>
+      </p:sp>
+      <p:sp>
+        <p:nvSpPr>
+          <p:cNvPr id="4" name="Footer Placeholder 3"/>
+          <p:cNvSpPr>
+            <a:spLocks noGrp="1"/>
+          </p:cNvSpPr>
+          <p:nvPr>
+            <p:ph type="ftr" sz="quarter" idx="10"/>
+          </p:nvPr>
+        </p:nvSpPr>
+        <p:spPr/>
+        <p:txBody>
+          <a:bodyPr/>
+          <a:lstStyle/>
+          <a:p>
+            <a:pPr>
+              <a:defRPr/>
+            </a:pPr>
+            <a:r>
+              <a:rPr lang="en-US" altLang="en-US" dirty="0"/>
+              <a:t>©2018 Steve Simon    http://TheAnalysisFactor.com</a:t>
+            </a:r>
+          </a:p>
+        </p:txBody>
+      </p:sp>
+      <p:sp>
+        <p:nvSpPr>
+          <p:cNvPr id="5" name="Slide Number Placeholder 4"/>
+          <p:cNvSpPr>
+            <a:spLocks noGrp="1"/>
+          </p:cNvSpPr>
+          <p:nvPr>
+            <p:ph type="sldNum" sz="quarter" idx="11"/>
+          </p:nvPr>
+        </p:nvSpPr>
+        <p:spPr/>
+        <p:txBody>
+          <a:bodyPr/>
+          <a:lstStyle/>
+          <a:p>
+            <a:pPr>
+              <a:defRPr/>
+            </a:pPr>
+            <a:endParaRPr lang="en-US"/>
+          </a:p>
+          <a:p>
+            <a:pPr>
+              <a:defRPr/>
+            </a:pPr>
+            <a:fld id="{E9A8CBA3-AA2B-46A6-BFA3-DCEBEAAB3F0A}" type="slidenum">
+              <a:rPr lang="en-US" smtClean="0"/>
+              <a:pPr>
+                <a:defRPr/>
+              </a:pPr>
+              <a:t>48</a:t>
+            </a:fld>
+            <a:endParaRPr lang="en-US"/>
+          </a:p>
+        </p:txBody>
+      </p:sp>
+      <p:pic>
+        <p:nvPicPr>
+          <p:cNvPr id="6" name="Picture 5">
+            <a:extLst>
+              <a:ext uri="{FF2B5EF4-FFF2-40B4-BE49-F238E27FC236}">
+                <a16:creationId xmlns:a16="http://schemas.microsoft.com/office/drawing/2014/main" id="{449423BB-9EFB-4CA8-81B0-F62DC81BB68B}"/>
+              </a:ext>
+            </a:extLst>
+          </p:cNvPr>
+          <p:cNvPicPr>
+            <a:picLocks noChangeAspect="1"/>
+          </p:cNvPicPr>
+          <p:nvPr/>
+        </p:nvPicPr>
+        <p:blipFill>
+          <a:blip r:embed="rId2"/>
+          <a:stretch>
+            <a:fillRect/>
+          </a:stretch>
+        </p:blipFill>
+        <p:spPr>
+          <a:xfrm>
+            <a:off x="532016" y="1143000"/>
+            <a:ext cx="8161905" cy="2819048"/>
+          </a:xfrm>
+          <a:prstGeom prst="rect">
+            <a:avLst/>
+          </a:prstGeom>
+        </p:spPr>
+      </p:pic>
+    </p:spTree>
+    <p:extLst>
+      <p:ext uri="{BB962C8B-B14F-4D97-AF65-F5344CB8AC3E}">
+        <p14:creationId xmlns:p14="http://schemas.microsoft.com/office/powerpoint/2010/main" val="1572589001"/>
+      </p:ext>
+    </p:extLst>
+  </p:cSld>
+  <p:clrMapOvr>
+    <a:masterClrMapping/>
+  </p:clrMapOvr>
+</p:sld>
+</file>
+
+<file path=ppt/slides/slide49.xml><?xml version="1.0" encoding="utf-8"?>
+<p:sld xmlns:a="http://schemas.openxmlformats.org/drawingml/2006/main" xmlns:r="http://schemas.openxmlformats.org/officeDocument/2006/relationships" xmlns:p="http://schemas.openxmlformats.org/presentationml/2006/main">
+  <p:cSld>
+    <p:spTree>
+      <p:nvGrpSpPr>
+        <p:cNvPr id="1" name=""/>
+        <p:cNvGrpSpPr/>
+        <p:nvPr/>
+      </p:nvGrpSpPr>
+      <p:grpSpPr>
+        <a:xfrm>
+          <a:off x="0" y="0"/>
+          <a:ext cx="0" cy="0"/>
+          <a:chOff x="0" y="0"/>
+          <a:chExt cx="0" cy="0"/>
+        </a:xfrm>
+      </p:grpSpPr>
+      <p:sp>
+        <p:nvSpPr>
+          <p:cNvPr id="2" name="Title 1"/>
+          <p:cNvSpPr>
+            <a:spLocks noGrp="1"/>
+          </p:cNvSpPr>
+          <p:nvPr>
+            <p:ph type="title"/>
+          </p:nvPr>
+        </p:nvSpPr>
+        <p:spPr/>
+        <p:txBody>
+          <a:bodyPr/>
+          <a:lstStyle/>
+          <a:p>
+            <a:r>
+              <a:rPr lang="en-US" dirty="0"/>
+              <a:t>The competing risks model</a:t>
+            </a:r>
+          </a:p>
+        </p:txBody>
+      </p:sp>
+      <p:sp>
+        <p:nvSpPr>
+          <p:cNvPr id="4" name="Footer Placeholder 3"/>
+          <p:cNvSpPr>
+            <a:spLocks noGrp="1"/>
+          </p:cNvSpPr>
+          <p:nvPr>
+            <p:ph type="ftr" sz="quarter" idx="10"/>
+          </p:nvPr>
+        </p:nvSpPr>
+        <p:spPr/>
+        <p:txBody>
+          <a:bodyPr/>
+          <a:lstStyle/>
+          <a:p>
+            <a:pPr>
+              <a:defRPr/>
+            </a:pPr>
+            <a:r>
+              <a:rPr lang="en-US" altLang="en-US" dirty="0"/>
+              <a:t>©2018 Steve Simon    http://TheAnalysisFactor.com</a:t>
+            </a:r>
+          </a:p>
+        </p:txBody>
+      </p:sp>
+      <p:sp>
+        <p:nvSpPr>
+          <p:cNvPr id="5" name="Slide Number Placeholder 4"/>
+          <p:cNvSpPr>
+            <a:spLocks noGrp="1"/>
+          </p:cNvSpPr>
+          <p:nvPr>
+            <p:ph type="sldNum" sz="quarter" idx="11"/>
+          </p:nvPr>
+        </p:nvSpPr>
+        <p:spPr/>
+        <p:txBody>
+          <a:bodyPr/>
+          <a:lstStyle/>
+          <a:p>
+            <a:pPr>
+              <a:defRPr/>
+            </a:pPr>
+            <a:endParaRPr lang="en-US"/>
+          </a:p>
+          <a:p>
+            <a:pPr>
+              <a:defRPr/>
+            </a:pPr>
+            <a:fld id="{E9A8CBA3-AA2B-46A6-BFA3-DCEBEAAB3F0A}" type="slidenum">
+              <a:rPr lang="en-US" smtClean="0"/>
+              <a:pPr>
+                <a:defRPr/>
+              </a:pPr>
+              <a:t>49</a:t>
+            </a:fld>
+            <a:endParaRPr lang="en-US"/>
+          </a:p>
+        </p:txBody>
+      </p:sp>
+      <p:pic>
+        <p:nvPicPr>
+          <p:cNvPr id="7" name="Picture 6">
+            <a:extLst>
+              <a:ext uri="{FF2B5EF4-FFF2-40B4-BE49-F238E27FC236}">
+                <a16:creationId xmlns:a16="http://schemas.microsoft.com/office/drawing/2014/main" id="{1F18366F-0F43-4B55-B758-4448E29CA130}"/>
+              </a:ext>
+            </a:extLst>
+          </p:cNvPr>
+          <p:cNvPicPr>
+            <a:picLocks noChangeAspect="1"/>
+          </p:cNvPicPr>
+          <p:nvPr/>
+        </p:nvPicPr>
+        <p:blipFill>
+          <a:blip r:embed="rId2"/>
+          <a:stretch>
+            <a:fillRect/>
+          </a:stretch>
+        </p:blipFill>
+        <p:spPr>
+          <a:xfrm>
+            <a:off x="500571" y="1197277"/>
+            <a:ext cx="8142857" cy="2419048"/>
+          </a:xfrm>
+          <a:prstGeom prst="rect">
+            <a:avLst/>
+          </a:prstGeom>
+        </p:spPr>
+      </p:pic>
+    </p:spTree>
+    <p:extLst>
+      <p:ext uri="{BB962C8B-B14F-4D97-AF65-F5344CB8AC3E}">
+        <p14:creationId xmlns:p14="http://schemas.microsoft.com/office/powerpoint/2010/main" val="3680718038"/>
+      </p:ext>
+    </p:extLst>
+  </p:cSld>
+  <p:clrMapOvr>
+    <a:masterClrMapping/>
+  </p:clrMapOvr>
+</p:sld>
+</file>
+
+<file path=ppt/slides/slide5.xml><?xml version="1.0" encoding="utf-8"?>
+<p:sld xmlns:a="http://schemas.openxmlformats.org/drawingml/2006/main" xmlns:r="http://schemas.openxmlformats.org/officeDocument/2006/relationships" xmlns:p="http://schemas.openxmlformats.org/presentationml/2006/main">
+  <p:cSld>
+    <p:spTree>
+      <p:nvGrpSpPr>
+        <p:cNvPr id="1" name=""/>
+        <p:cNvGrpSpPr/>
+        <p:nvPr/>
+      </p:nvGrpSpPr>
+      <p:grpSpPr>
+        <a:xfrm>
+          <a:off x="0" y="0"/>
+          <a:ext cx="0" cy="0"/>
+          <a:chOff x="0" y="0"/>
+          <a:chExt cx="0" cy="0"/>
+        </a:xfrm>
+      </p:grpSpPr>
+      <p:sp>
+        <p:nvSpPr>
+          <p:cNvPr id="2" name="Title 1"/>
+          <p:cNvSpPr>
+            <a:spLocks noGrp="1"/>
+          </p:cNvSpPr>
+          <p:nvPr>
+            <p:ph type="title"/>
+          </p:nvPr>
+        </p:nvSpPr>
+        <p:spPr/>
+        <p:txBody>
+          <a:bodyPr/>
+          <a:lstStyle/>
+          <a:p>
+            <a:r>
+              <a:rPr lang="en-US" dirty="0"/>
+              <a:t>The leader data set</a:t>
+            </a:r>
+          </a:p>
+        </p:txBody>
+      </p:sp>
+      <p:sp>
+        <p:nvSpPr>
+          <p:cNvPr id="3" name="Text Placeholder 2"/>
+          <p:cNvSpPr>
+            <a:spLocks noGrp="1"/>
+          </p:cNvSpPr>
+          <p:nvPr>
+            <p:ph type="body" idx="1"/>
+          </p:nvPr>
+        </p:nvSpPr>
+        <p:spPr/>
+        <p:txBody>
+          <a:bodyPr/>
+          <a:lstStyle/>
+          <a:p>
+            <a:r>
+              <a:rPr lang="en-US" dirty="0">
+                <a:latin typeface="Courier New" panose="02070309020205020404" pitchFamily="49" charset="0"/>
+                <a:cs typeface="Courier New" panose="02070309020205020404" pitchFamily="49" charset="0"/>
+              </a:rPr>
+              <a:t>manner     constitutional ascent</a:t>
+            </a:r>
+          </a:p>
+          <a:p>
+            <a:r>
+              <a:rPr lang="en-US" dirty="0">
+                <a:latin typeface="Courier New" panose="02070309020205020404" pitchFamily="49" charset="0"/>
+                <a:cs typeface="Courier New" panose="02070309020205020404" pitchFamily="49" charset="0"/>
+              </a:rPr>
+              <a:t>                             280</a:t>
+            </a:r>
+          </a:p>
+          <a:p>
+            <a:r>
+              <a:rPr lang="en-US" dirty="0">
+                <a:latin typeface="Courier New" panose="02070309020205020404" pitchFamily="49" charset="0"/>
+                <a:cs typeface="Courier New" panose="02070309020205020404" pitchFamily="49" charset="0"/>
+              </a:rPr>
+              <a:t>        </a:t>
+            </a:r>
+            <a:r>
+              <a:rPr lang="en-US" dirty="0" err="1">
+                <a:latin typeface="Courier New" panose="02070309020205020404" pitchFamily="49" charset="0"/>
+                <a:cs typeface="Courier New" panose="02070309020205020404" pitchFamily="49" charset="0"/>
+              </a:rPr>
+              <a:t>nonconstitutional</a:t>
+            </a:r>
+            <a:r>
+              <a:rPr lang="en-US" dirty="0">
+                <a:latin typeface="Courier New" panose="02070309020205020404" pitchFamily="49" charset="0"/>
+                <a:cs typeface="Courier New" panose="02070309020205020404" pitchFamily="49" charset="0"/>
+              </a:rPr>
+              <a:t> ascent</a:t>
+            </a:r>
+          </a:p>
+          <a:p>
+            <a:r>
+              <a:rPr lang="en-US" dirty="0">
+                <a:latin typeface="Courier New" panose="02070309020205020404" pitchFamily="49" charset="0"/>
+                <a:cs typeface="Courier New" panose="02070309020205020404" pitchFamily="49" charset="0"/>
+              </a:rPr>
+              <a:t>                             158</a:t>
+            </a:r>
+          </a:p>
+          <a:p>
+            <a:endParaRPr lang="en-US" dirty="0">
+              <a:latin typeface="Courier New" panose="02070309020205020404" pitchFamily="49" charset="0"/>
+              <a:cs typeface="Courier New" panose="02070309020205020404" pitchFamily="49" charset="0"/>
+            </a:endParaRPr>
+          </a:p>
+          <a:p>
+            <a:r>
+              <a:rPr lang="en-US" dirty="0">
+                <a:latin typeface="Courier New" panose="02070309020205020404" pitchFamily="49" charset="0"/>
+                <a:cs typeface="Courier New" panose="02070309020205020404" pitchFamily="49" charset="0"/>
+              </a:rPr>
+              <a:t>start Min. 1st Qu.  Median    Mean 3rd Qu.    Max. </a:t>
+            </a:r>
+          </a:p>
+          <a:p>
+            <a:r>
+              <a:rPr lang="en-US" dirty="0">
+                <a:latin typeface="Courier New" panose="02070309020205020404" pitchFamily="49" charset="0"/>
+                <a:cs typeface="Courier New" panose="02070309020205020404" pitchFamily="49" charset="0"/>
+              </a:rPr>
+              <a:t>      1960    1965    1973    1973    1979    1987</a:t>
+            </a:r>
+          </a:p>
+          <a:p>
+            <a:endParaRPr lang="en-US" dirty="0">
+              <a:latin typeface="Courier New" panose="02070309020205020404" pitchFamily="49" charset="0"/>
+              <a:cs typeface="Courier New" panose="02070309020205020404" pitchFamily="49" charset="0"/>
+            </a:endParaRPr>
+          </a:p>
+          <a:p>
+            <a:r>
+              <a:rPr lang="en-US" dirty="0">
+                <a:latin typeface="Courier New" panose="02070309020205020404" pitchFamily="49" charset="0"/>
+                <a:cs typeface="Courier New" panose="02070309020205020404" pitchFamily="49" charset="0"/>
+              </a:rPr>
+              <a:t>military   no yes </a:t>
+            </a:r>
+          </a:p>
+          <a:p>
+            <a:r>
+              <a:rPr lang="en-US" dirty="0">
+                <a:latin typeface="Courier New" panose="02070309020205020404" pitchFamily="49" charset="0"/>
+                <a:cs typeface="Courier New" panose="02070309020205020404" pitchFamily="49" charset="0"/>
+              </a:rPr>
+              <a:t>          294 144</a:t>
+            </a:r>
+          </a:p>
+          <a:p>
+            <a:endParaRPr lang="en-US" dirty="0">
+              <a:latin typeface="Courier New" panose="02070309020205020404" pitchFamily="49" charset="0"/>
+              <a:cs typeface="Courier New" panose="02070309020205020404" pitchFamily="49" charset="0"/>
+            </a:endParaRPr>
+          </a:p>
+        </p:txBody>
+      </p:sp>
+      <p:sp>
+        <p:nvSpPr>
+          <p:cNvPr id="4" name="Footer Placeholder 3"/>
+          <p:cNvSpPr>
+            <a:spLocks noGrp="1"/>
+          </p:cNvSpPr>
+          <p:nvPr>
+            <p:ph type="ftr" sz="quarter" idx="10"/>
+          </p:nvPr>
+        </p:nvSpPr>
+        <p:spPr/>
+        <p:txBody>
+          <a:bodyPr/>
+          <a:lstStyle/>
+          <a:p>
+            <a:pPr>
+              <a:defRPr/>
+            </a:pPr>
+            <a:r>
+              <a:rPr lang="en-US" altLang="en-US" dirty="0"/>
+              <a:t>©2018 Steve Simon    http://TheAnalysisFactor.com</a:t>
+            </a:r>
+          </a:p>
+        </p:txBody>
+      </p:sp>
+      <p:sp>
+        <p:nvSpPr>
+          <p:cNvPr id="5" name="Slide Number Placeholder 4"/>
+          <p:cNvSpPr>
+            <a:spLocks noGrp="1"/>
+          </p:cNvSpPr>
+          <p:nvPr>
+            <p:ph type="sldNum" sz="quarter" idx="11"/>
+          </p:nvPr>
+        </p:nvSpPr>
+        <p:spPr/>
+        <p:txBody>
+          <a:bodyPr/>
+          <a:lstStyle/>
+          <a:p>
+            <a:pPr>
+              <a:defRPr/>
+            </a:pPr>
+            <a:endParaRPr lang="en-US"/>
+          </a:p>
+          <a:p>
+            <a:pPr>
+              <a:defRPr/>
+            </a:pPr>
+            <a:fld id="{E9A8CBA3-AA2B-46A6-BFA3-DCEBEAAB3F0A}" type="slidenum">
+              <a:rPr lang="en-US" smtClean="0"/>
+              <a:pPr>
+                <a:defRPr/>
+              </a:pPr>
+              <a:t>5</a:t>
+            </a:fld>
+            <a:endParaRPr lang="en-US"/>
+          </a:p>
+        </p:txBody>
+      </p:sp>
+      <p:sp>
+        <p:nvSpPr>
+          <p:cNvPr id="6" name="Text Placeholder 5"/>
+          <p:cNvSpPr>
+            <a:spLocks noGrp="1"/>
+          </p:cNvSpPr>
+          <p:nvPr>
+            <p:ph type="body" sz="quarter" idx="12"/>
+          </p:nvPr>
+        </p:nvSpPr>
+        <p:spPr/>
+        <p:txBody>
+          <a:bodyPr/>
+          <a:lstStyle/>
+          <a:p>
+            <a:r>
+              <a:rPr lang="en-US" dirty="0"/>
+              <a:t>Variables</a:t>
+            </a:r>
+          </a:p>
+        </p:txBody>
+      </p:sp>
+    </p:spTree>
+    <p:extLst>
+      <p:ext uri="{BB962C8B-B14F-4D97-AF65-F5344CB8AC3E}">
+        <p14:creationId xmlns:p14="http://schemas.microsoft.com/office/powerpoint/2010/main" val="3616100379"/>
+      </p:ext>
+    </p:extLst>
+  </p:cSld>
+  <p:clrMapOvr>
+    <a:masterClrMapping/>
+  </p:clrMapOvr>
+</p:sld>
+</file>
+
+<file path=ppt/slides/slide50.xml><?xml version="1.0" encoding="utf-8"?>
+<p:sld xmlns:a="http://schemas.openxmlformats.org/drawingml/2006/main" xmlns:r="http://schemas.openxmlformats.org/officeDocument/2006/relationships" xmlns:p="http://schemas.openxmlformats.org/presentationml/2006/main">
+  <p:cSld>
+    <p:spTree>
+      <p:nvGrpSpPr>
+        <p:cNvPr id="1" name=""/>
+        <p:cNvGrpSpPr/>
+        <p:nvPr/>
+      </p:nvGrpSpPr>
+      <p:grpSpPr>
+        <a:xfrm>
+          <a:off x="0" y="0"/>
+          <a:ext cx="0" cy="0"/>
+          <a:chOff x="0" y="0"/>
+          <a:chExt cx="0" cy="0"/>
+        </a:xfrm>
+      </p:grpSpPr>
+      <p:sp>
+        <p:nvSpPr>
+          <p:cNvPr id="2" name="Title 1"/>
+          <p:cNvSpPr>
+            <a:spLocks noGrp="1"/>
+          </p:cNvSpPr>
+          <p:nvPr>
+            <p:ph type="title"/>
+          </p:nvPr>
+        </p:nvSpPr>
+        <p:spPr/>
+        <p:txBody>
+          <a:bodyPr/>
+          <a:lstStyle/>
+          <a:p>
+            <a:r>
+              <a:rPr lang="en-US" dirty="0"/>
+              <a:t>Competing risks, constitutional exit</a:t>
+            </a:r>
+          </a:p>
+        </p:txBody>
+      </p:sp>
+      <p:sp>
+        <p:nvSpPr>
+          <p:cNvPr id="4" name="Footer Placeholder 3"/>
+          <p:cNvSpPr>
+            <a:spLocks noGrp="1"/>
+          </p:cNvSpPr>
+          <p:nvPr>
+            <p:ph type="ftr" sz="quarter" idx="10"/>
+          </p:nvPr>
+        </p:nvSpPr>
+        <p:spPr/>
+        <p:txBody>
+          <a:bodyPr/>
+          <a:lstStyle/>
+          <a:p>
+            <a:pPr>
+              <a:defRPr/>
+            </a:pPr>
+            <a:r>
+              <a:rPr lang="en-US" altLang="en-US" dirty="0"/>
+              <a:t>©2018 Steve Simon    http://TheAnalysisFactor.com</a:t>
+            </a:r>
+          </a:p>
+        </p:txBody>
+      </p:sp>
+      <p:sp>
+        <p:nvSpPr>
+          <p:cNvPr id="5" name="Slide Number Placeholder 4"/>
+          <p:cNvSpPr>
+            <a:spLocks noGrp="1"/>
+          </p:cNvSpPr>
+          <p:nvPr>
+            <p:ph type="sldNum" sz="quarter" idx="11"/>
+          </p:nvPr>
+        </p:nvSpPr>
+        <p:spPr/>
+        <p:txBody>
+          <a:bodyPr/>
+          <a:lstStyle/>
+          <a:p>
+            <a:pPr>
+              <a:defRPr/>
+            </a:pPr>
+            <a:endParaRPr lang="en-US"/>
+          </a:p>
+          <a:p>
+            <a:pPr>
+              <a:defRPr/>
+            </a:pPr>
+            <a:fld id="{E9A8CBA3-AA2B-46A6-BFA3-DCEBEAAB3F0A}" type="slidenum">
+              <a:rPr lang="en-US" smtClean="0"/>
+              <a:pPr>
+                <a:defRPr/>
+              </a:pPr>
+              <a:t>50</a:t>
             </a:fld>
             <a:endParaRPr lang="en-US"/>
           </a:p>
@@ -10847,7 +11532,7 @@
     </p:spTree>
     <p:extLst>
       <p:ext uri="{BB962C8B-B14F-4D97-AF65-F5344CB8AC3E}">
-        <p14:creationId xmlns:p14="http://schemas.microsoft.com/office/powerpoint/2010/main" val="3926105125"/>
+        <p14:creationId xmlns:p14="http://schemas.microsoft.com/office/powerpoint/2010/main" val="2584032636"/>
       </p:ext>
     </p:extLst>
   </p:cSld>
@@ -10857,7 +11542,7 @@
 </p:sld>
 </file>
 
-<file path=ppt/slides/slide48.xml><?xml version="1.0" encoding="utf-8"?>
+<file path=ppt/slides/slide51.xml><?xml version="1.0" encoding="utf-8"?>
 <p:sld xmlns:a="http://schemas.openxmlformats.org/drawingml/2006/main" xmlns:r="http://schemas.openxmlformats.org/officeDocument/2006/relationships" xmlns:p="http://schemas.openxmlformats.org/presentationml/2006/main">
   <p:cSld>
     <p:spTree>
@@ -10891,7 +11576,7 @@
           <a:p>
             <a:r>
               <a:rPr lang="en-US" dirty="0"/>
-              <a:t>The leader data set, competing risks</a:t>
+              <a:t>Competing risks, natural death</a:t>
             </a:r>
           </a:p>
         </p:txBody>
@@ -10950,7 +11635,7 @@
               <a:pPr>
                 <a:defRPr/>
               </a:pPr>
-              <a:t>48</a:t>
+              <a:t>51</a:t>
             </a:fld>
             <a:endParaRPr lang="en-US"/>
           </a:p>
@@ -10999,7 +11684,7 @@
 </p:sld>
 </file>
 
-<file path=ppt/slides/slide49.xml><?xml version="1.0" encoding="utf-8"?>
+<file path=ppt/slides/slide52.xml><?xml version="1.0" encoding="utf-8"?>
 <p:sld xmlns:a="http://schemas.openxmlformats.org/drawingml/2006/main" xmlns:r="http://schemas.openxmlformats.org/officeDocument/2006/relationships" xmlns:p="http://schemas.openxmlformats.org/presentationml/2006/main">
   <p:cSld>
     <p:spTree>
@@ -11033,7 +11718,15 @@
           <a:p>
             <a:r>
               <a:rPr lang="en-US" dirty="0"/>
-              <a:t>The leader data set, competing risks</a:t>
+              <a:t>Competing risks, </a:t>
+            </a:r>
+            <a:r>
+              <a:rPr lang="en-US" dirty="0" err="1"/>
+              <a:t>nonconstitutional</a:t>
+            </a:r>
+            <a:r>
+              <a:rPr lang="en-US" dirty="0"/>
+              <a:t> exit</a:t>
             </a:r>
           </a:p>
         </p:txBody>
@@ -11092,7 +11785,7 @@
               <a:pPr>
                 <a:defRPr/>
               </a:pPr>
-              <a:t>49</a:t>
+              <a:t>52</a:t>
             </a:fld>
             <a:endParaRPr lang="en-US"/>
           </a:p>
@@ -11141,7 +11834,7 @@
 </p:sld>
 </file>
 
-<file path=ppt/slides/slide5.xml><?xml version="1.0" encoding="utf-8"?>
+<file path=ppt/slides/slide53.xml><?xml version="1.0" encoding="utf-8"?>
 <p:sld xmlns:a="http://schemas.openxmlformats.org/drawingml/2006/main" xmlns:r="http://schemas.openxmlformats.org/officeDocument/2006/relationships" xmlns:p="http://schemas.openxmlformats.org/presentationml/2006/main">
   <p:cSld>
     <p:spTree>
@@ -11175,128 +11868,8 @@
           <a:p>
             <a:r>
               <a:rPr lang="en-US" dirty="0"/>
-              <a:t>The leader data set</a:t>
-            </a:r>
-          </a:p>
-        </p:txBody>
-      </p:sp>
-      <p:sp>
-        <p:nvSpPr>
-          <p:cNvPr id="3" name="Text Placeholder 2"/>
-          <p:cNvSpPr>
-            <a:spLocks noGrp="1"/>
-          </p:cNvSpPr>
-          <p:nvPr>
-            <p:ph type="body" idx="1"/>
-          </p:nvPr>
-        </p:nvSpPr>
-        <p:spPr/>
-        <p:txBody>
-          <a:bodyPr/>
-          <a:lstStyle/>
-          <a:p>
-            <a:r>
-              <a:rPr lang="en-US" dirty="0">
-                <a:latin typeface="Courier New" panose="02070309020205020404" pitchFamily="49" charset="0"/>
-                <a:cs typeface="Courier New" panose="02070309020205020404" pitchFamily="49" charset="0"/>
-              </a:rPr>
-              <a:t>manner     constitutional ascent</a:t>
-            </a:r>
-          </a:p>
-          <a:p>
-            <a:r>
-              <a:rPr lang="en-US" dirty="0">
-                <a:latin typeface="Courier New" panose="02070309020205020404" pitchFamily="49" charset="0"/>
-                <a:cs typeface="Courier New" panose="02070309020205020404" pitchFamily="49" charset="0"/>
-              </a:rPr>
-              <a:t>                             280</a:t>
-            </a:r>
-          </a:p>
-          <a:p>
-            <a:r>
-              <a:rPr lang="en-US" dirty="0">
-                <a:latin typeface="Courier New" panose="02070309020205020404" pitchFamily="49" charset="0"/>
-                <a:cs typeface="Courier New" panose="02070309020205020404" pitchFamily="49" charset="0"/>
-              </a:rPr>
-              <a:t>        </a:t>
-            </a:r>
-            <a:r>
-              <a:rPr lang="en-US" dirty="0" err="1">
-                <a:latin typeface="Courier New" panose="02070309020205020404" pitchFamily="49" charset="0"/>
-                <a:cs typeface="Courier New" panose="02070309020205020404" pitchFamily="49" charset="0"/>
-              </a:rPr>
-              <a:t>nonconstitutional</a:t>
-            </a:r>
-            <a:r>
-              <a:rPr lang="en-US" dirty="0">
-                <a:latin typeface="Courier New" panose="02070309020205020404" pitchFamily="49" charset="0"/>
-                <a:cs typeface="Courier New" panose="02070309020205020404" pitchFamily="49" charset="0"/>
-              </a:rPr>
-              <a:t> ascent</a:t>
-            </a:r>
-          </a:p>
-          <a:p>
-            <a:r>
-              <a:rPr lang="en-US" dirty="0">
-                <a:latin typeface="Courier New" panose="02070309020205020404" pitchFamily="49" charset="0"/>
-                <a:cs typeface="Courier New" panose="02070309020205020404" pitchFamily="49" charset="0"/>
-              </a:rPr>
-              <a:t>                             158</a:t>
-            </a:r>
-          </a:p>
-          <a:p>
-            <a:endParaRPr lang="en-US" dirty="0">
-              <a:latin typeface="Courier New" panose="02070309020205020404" pitchFamily="49" charset="0"/>
-              <a:cs typeface="Courier New" panose="02070309020205020404" pitchFamily="49" charset="0"/>
-            </a:endParaRPr>
-          </a:p>
-          <a:p>
-            <a:r>
-              <a:rPr lang="en-US" dirty="0">
-                <a:latin typeface="Courier New" panose="02070309020205020404" pitchFamily="49" charset="0"/>
-                <a:cs typeface="Courier New" panose="02070309020205020404" pitchFamily="49" charset="0"/>
-              </a:rPr>
-              <a:t>start Min. 1st Qu.  Median    Mean 3rd Qu.    Max. </a:t>
-            </a:r>
-          </a:p>
-          <a:p>
-            <a:r>
-              <a:rPr lang="en-US" dirty="0">
-                <a:latin typeface="Courier New" panose="02070309020205020404" pitchFamily="49" charset="0"/>
-                <a:cs typeface="Courier New" panose="02070309020205020404" pitchFamily="49" charset="0"/>
-              </a:rPr>
-              <a:t>      1960    1965    1973    1973    1979    1987</a:t>
-            </a:r>
-          </a:p>
-          <a:p>
-            <a:endParaRPr lang="en-US" dirty="0">
-              <a:latin typeface="Courier New" panose="02070309020205020404" pitchFamily="49" charset="0"/>
-              <a:cs typeface="Courier New" panose="02070309020205020404" pitchFamily="49" charset="0"/>
-            </a:endParaRPr>
-          </a:p>
-          <a:p>
-            <a:r>
-              <a:rPr lang="en-US" dirty="0">
-                <a:latin typeface="Courier New" panose="02070309020205020404" pitchFamily="49" charset="0"/>
-                <a:cs typeface="Courier New" panose="02070309020205020404" pitchFamily="49" charset="0"/>
-              </a:rPr>
-              <a:t>military   no yes </a:t>
-            </a:r>
-          </a:p>
-          <a:p>
-            <a:r>
-              <a:rPr lang="en-US" dirty="0">
-                <a:latin typeface="Courier New" panose="02070309020205020404" pitchFamily="49" charset="0"/>
-                <a:cs typeface="Courier New" panose="02070309020205020404" pitchFamily="49" charset="0"/>
-              </a:rPr>
-              <a:t>          294 144</a:t>
-            </a:r>
-          </a:p>
-          <a:p>
-            <a:endParaRPr lang="en-US" dirty="0">
-              <a:latin typeface="Courier New" panose="02070309020205020404" pitchFamily="49" charset="0"/>
-              <a:cs typeface="Courier New" panose="02070309020205020404" pitchFamily="49" charset="0"/>
-            </a:endParaRPr>
+              <a:t>Competing risks, probability of no exit</a:t>
+            </a:r>
           </a:p>
         </p:txBody>
       </p:sp>
@@ -11354,141 +11927,7 @@
               <a:pPr>
                 <a:defRPr/>
               </a:pPr>
-              <a:t>5</a:t>
-            </a:fld>
-            <a:endParaRPr lang="en-US"/>
-          </a:p>
-        </p:txBody>
-      </p:sp>
-      <p:sp>
-        <p:nvSpPr>
-          <p:cNvPr id="6" name="Text Placeholder 5"/>
-          <p:cNvSpPr>
-            <a:spLocks noGrp="1"/>
-          </p:cNvSpPr>
-          <p:nvPr>
-            <p:ph type="body" sz="quarter" idx="12"/>
-          </p:nvPr>
-        </p:nvSpPr>
-        <p:spPr/>
-        <p:txBody>
-          <a:bodyPr/>
-          <a:lstStyle/>
-          <a:p>
-            <a:r>
-              <a:rPr lang="en-US" dirty="0"/>
-              <a:t>Variables</a:t>
-            </a:r>
-          </a:p>
-        </p:txBody>
-      </p:sp>
-    </p:spTree>
-    <p:extLst>
-      <p:ext uri="{BB962C8B-B14F-4D97-AF65-F5344CB8AC3E}">
-        <p14:creationId xmlns:p14="http://schemas.microsoft.com/office/powerpoint/2010/main" val="3616100379"/>
-      </p:ext>
-    </p:extLst>
-  </p:cSld>
-  <p:clrMapOvr>
-    <a:masterClrMapping/>
-  </p:clrMapOvr>
-</p:sld>
-</file>
-
-<file path=ppt/slides/slide50.xml><?xml version="1.0" encoding="utf-8"?>
-<p:sld xmlns:a="http://schemas.openxmlformats.org/drawingml/2006/main" xmlns:r="http://schemas.openxmlformats.org/officeDocument/2006/relationships" xmlns:p="http://schemas.openxmlformats.org/presentationml/2006/main">
-  <p:cSld>
-    <p:spTree>
-      <p:nvGrpSpPr>
-        <p:cNvPr id="1" name=""/>
-        <p:cNvGrpSpPr/>
-        <p:nvPr/>
-      </p:nvGrpSpPr>
-      <p:grpSpPr>
-        <a:xfrm>
-          <a:off x="0" y="0"/>
-          <a:ext cx="0" cy="0"/>
-          <a:chOff x="0" y="0"/>
-          <a:chExt cx="0" cy="0"/>
-        </a:xfrm>
-      </p:grpSpPr>
-      <p:sp>
-        <p:nvSpPr>
-          <p:cNvPr id="2" name="Title 1"/>
-          <p:cNvSpPr>
-            <a:spLocks noGrp="1"/>
-          </p:cNvSpPr>
-          <p:nvPr>
-            <p:ph type="title"/>
-          </p:nvPr>
-        </p:nvSpPr>
-        <p:spPr/>
-        <p:txBody>
-          <a:bodyPr/>
-          <a:lstStyle/>
-          <a:p>
-            <a:r>
-              <a:rPr lang="en-US" dirty="0"/>
-              <a:t>The leader data set, competing risks</a:t>
-            </a:r>
-          </a:p>
-        </p:txBody>
-      </p:sp>
-      <p:sp>
-        <p:nvSpPr>
-          <p:cNvPr id="4" name="Footer Placeholder 3"/>
-          <p:cNvSpPr>
-            <a:spLocks noGrp="1"/>
-          </p:cNvSpPr>
-          <p:nvPr>
-            <p:ph type="ftr" sz="quarter" idx="10"/>
-          </p:nvPr>
-        </p:nvSpPr>
-        <p:spPr/>
-        <p:txBody>
-          <a:bodyPr/>
-          <a:lstStyle/>
-          <a:p>
-            <a:pPr>
-              <a:defRPr/>
-            </a:pPr>
-            <a:r>
-              <a:rPr lang="en-US" altLang="en-US" dirty="0"/>
-              <a:t>©2018 Steve Simon    http://TheAnalysisFactor.com</a:t>
-            </a:r>
-          </a:p>
-        </p:txBody>
-      </p:sp>
-      <p:sp>
-        <p:nvSpPr>
-          <p:cNvPr id="5" name="Slide Number Placeholder 4"/>
-          <p:cNvSpPr>
-            <a:spLocks noGrp="1"/>
-          </p:cNvSpPr>
-          <p:nvPr>
-            <p:ph type="sldNum" sz="quarter" idx="11"/>
-          </p:nvPr>
-        </p:nvSpPr>
-        <p:spPr/>
-        <p:txBody>
-          <a:bodyPr/>
-          <a:lstStyle/>
-          <a:p>
-            <a:pPr>
-              <a:defRPr/>
-            </a:pPr>
-            <a:endParaRPr lang="en-US"/>
-          </a:p>
-          <a:p>
-            <a:pPr>
-              <a:defRPr/>
-            </a:pPr>
-            <a:fld id="{E9A8CBA3-AA2B-46A6-BFA3-DCEBEAAB3F0A}" type="slidenum">
-              <a:rPr lang="en-US" smtClean="0"/>
-              <a:pPr>
-                <a:defRPr/>
-              </a:pPr>
-              <a:t>50</a:t>
+              <a:t>53</a:t>
             </a:fld>
             <a:endParaRPr lang="en-US"/>
           </a:p>
@@ -11537,7 +11976,7 @@
 </p:sld>
 </file>
 
-<file path=ppt/slides/slide51.xml><?xml version="1.0" encoding="utf-8"?>
+<file path=ppt/slides/slide54.xml><?xml version="1.0" encoding="utf-8"?>
 <p:sld xmlns:a="http://schemas.openxmlformats.org/drawingml/2006/main" xmlns:r="http://schemas.openxmlformats.org/officeDocument/2006/relationships" xmlns:p="http://schemas.openxmlformats.org/presentationml/2006/main">
   <p:cSld>
     <p:spTree>
@@ -11571,7 +12010,7 @@
           <a:p>
             <a:r>
               <a:rPr lang="en-US" dirty="0"/>
-              <a:t>The leader data set, competing risks</a:t>
+              <a:t>Probability of no exit matches overall survival</a:t>
             </a:r>
           </a:p>
         </p:txBody>
@@ -11630,7 +12069,7 @@
               <a:pPr>
                 <a:defRPr/>
               </a:pPr>
-              <a:t>51</a:t>
+              <a:t>54</a:t>
             </a:fld>
             <a:endParaRPr lang="en-US"/>
           </a:p>
@@ -11679,7 +12118,7 @@
 </p:sld>
 </file>
 
-<file path=ppt/slides/slide52.xml><?xml version="1.0" encoding="utf-8"?>
+<file path=ppt/slides/slide55.xml><?xml version="1.0" encoding="utf-8"?>
 <p:sld xmlns:a="http://schemas.openxmlformats.org/drawingml/2006/main" xmlns:r="http://schemas.openxmlformats.org/officeDocument/2006/relationships" xmlns:p="http://schemas.openxmlformats.org/presentationml/2006/main">
   <p:cSld>
     <p:spTree>
@@ -11772,7 +12211,7 @@
               <a:pPr>
                 <a:defRPr/>
               </a:pPr>
-              <a:t>52</a:t>
+              <a:t>55</a:t>
             </a:fld>
             <a:endParaRPr lang="en-US"/>
           </a:p>
@@ -11780,10 +12219,10 @@
       </p:sp>
       <p:pic>
         <p:nvPicPr>
-          <p:cNvPr id="3" name="Picture 2">
+          <p:cNvPr id="6" name="Picture 5">
             <a:extLst>
               <a:ext uri="{FF2B5EF4-FFF2-40B4-BE49-F238E27FC236}">
-                <a16:creationId xmlns:a16="http://schemas.microsoft.com/office/drawing/2014/main" id="{F217F728-613E-4801-B39F-8FBB3D1CC58F}"/>
+                <a16:creationId xmlns:a16="http://schemas.microsoft.com/office/drawing/2014/main" id="{ECCE54DF-4C6E-4A07-8F18-0E28E0E1DA3B}"/>
               </a:ext>
             </a:extLst>
           </p:cNvPr>
@@ -11800,8 +12239,8 @@
         </p:blipFill>
         <p:spPr>
           <a:xfrm>
-            <a:off x="457200" y="1143000"/>
-            <a:ext cx="8229600" cy="4572000"/>
+            <a:off x="457714" y="1143285"/>
+            <a:ext cx="8228571" cy="4571429"/>
           </a:xfrm>
           <a:prstGeom prst="rect">
             <a:avLst/>
@@ -11821,7 +12260,7 @@
 </p:sld>
 </file>
 
-<file path=ppt/slides/slide53.xml><?xml version="1.0" encoding="utf-8"?>
+<file path=ppt/slides/slide56.xml><?xml version="1.0" encoding="utf-8"?>
 <p:sld xmlns:a="http://schemas.openxmlformats.org/drawingml/2006/main" xmlns:r="http://schemas.openxmlformats.org/officeDocument/2006/relationships" xmlns:p="http://schemas.openxmlformats.org/presentationml/2006/main">
   <p:cSld>
     <p:spTree>
@@ -11855,35 +12294,7 @@
           <a:p>
             <a:r>
               <a:rPr lang="en-US" dirty="0"/>
-              <a:t>Conclusion</a:t>
-            </a:r>
-          </a:p>
-        </p:txBody>
-      </p:sp>
-      <p:sp>
-        <p:nvSpPr>
-          <p:cNvPr id="3" name="Text Placeholder 2"/>
-          <p:cNvSpPr>
-            <a:spLocks noGrp="1"/>
-          </p:cNvSpPr>
-          <p:nvPr>
-            <p:ph type="body" idx="1"/>
-          </p:nvPr>
-        </p:nvSpPr>
-        <p:spPr/>
-        <p:txBody>
-          <a:bodyPr/>
-          <a:lstStyle/>
-          <a:p>
-            <a:pPr marL="457200" indent="-457200">
-              <a:buFont typeface="+mj-lt"/>
-              <a:buAutoNum type="arabicPeriod"/>
-            </a:pPr>
-            <a:r>
-              <a:rPr lang="en-US" dirty="0">
-                <a:latin typeface="+mj-lt"/>
-              </a:rPr>
-              <a:t>Left</a:t>
+              <a:t>The leader data set, competing risks</a:t>
             </a:r>
           </a:p>
         </p:txBody>
@@ -11942,7 +12353,424 @@
               <a:pPr>
                 <a:defRPr/>
               </a:pPr>
-              <a:t>53</a:t>
+              <a:t>56</a:t>
+            </a:fld>
+            <a:endParaRPr lang="en-US"/>
+          </a:p>
+        </p:txBody>
+      </p:sp>
+      <p:pic>
+        <p:nvPicPr>
+          <p:cNvPr id="6" name="Picture 5">
+            <a:extLst>
+              <a:ext uri="{FF2B5EF4-FFF2-40B4-BE49-F238E27FC236}">
+                <a16:creationId xmlns:a16="http://schemas.microsoft.com/office/drawing/2014/main" id="{C6C00904-3DCC-44D5-A584-CFAC210CB3FB}"/>
+              </a:ext>
+            </a:extLst>
+          </p:cNvPr>
+          <p:cNvPicPr>
+            <a:picLocks noChangeAspect="1"/>
+          </p:cNvPicPr>
+          <p:nvPr/>
+        </p:nvPicPr>
+        <p:blipFill>
+          <a:blip r:embed="rId2"/>
+          <a:stretch>
+            <a:fillRect/>
+          </a:stretch>
+        </p:blipFill>
+        <p:spPr>
+          <a:xfrm>
+            <a:off x="457714" y="1143285"/>
+            <a:ext cx="8228571" cy="4571429"/>
+          </a:xfrm>
+          <a:prstGeom prst="rect">
+            <a:avLst/>
+          </a:prstGeom>
+        </p:spPr>
+      </p:pic>
+    </p:spTree>
+    <p:extLst>
+      <p:ext uri="{BB962C8B-B14F-4D97-AF65-F5344CB8AC3E}">
+        <p14:creationId xmlns:p14="http://schemas.microsoft.com/office/powerpoint/2010/main" val="147758692"/>
+      </p:ext>
+    </p:extLst>
+  </p:cSld>
+  <p:clrMapOvr>
+    <a:masterClrMapping/>
+  </p:clrMapOvr>
+</p:sld>
+</file>
+
+<file path=ppt/slides/slide57.xml><?xml version="1.0" encoding="utf-8"?>
+<p:sld xmlns:a="http://schemas.openxmlformats.org/drawingml/2006/main" xmlns:r="http://schemas.openxmlformats.org/officeDocument/2006/relationships" xmlns:p="http://schemas.openxmlformats.org/presentationml/2006/main">
+  <p:cSld>
+    <p:spTree>
+      <p:nvGrpSpPr>
+        <p:cNvPr id="1" name=""/>
+        <p:cNvGrpSpPr/>
+        <p:nvPr/>
+      </p:nvGrpSpPr>
+      <p:grpSpPr>
+        <a:xfrm>
+          <a:off x="0" y="0"/>
+          <a:ext cx="0" cy="0"/>
+          <a:chOff x="0" y="0"/>
+          <a:chExt cx="0" cy="0"/>
+        </a:xfrm>
+      </p:grpSpPr>
+      <p:sp>
+        <p:nvSpPr>
+          <p:cNvPr id="2" name="Title 1"/>
+          <p:cNvSpPr>
+            <a:spLocks noGrp="1"/>
+          </p:cNvSpPr>
+          <p:nvPr>
+            <p:ph type="title"/>
+          </p:nvPr>
+        </p:nvSpPr>
+        <p:spPr/>
+        <p:txBody>
+          <a:bodyPr/>
+          <a:lstStyle/>
+          <a:p>
+            <a:r>
+              <a:rPr lang="en-US" dirty="0"/>
+              <a:t>The leader data set, competing risks</a:t>
+            </a:r>
+          </a:p>
+        </p:txBody>
+      </p:sp>
+      <p:sp>
+        <p:nvSpPr>
+          <p:cNvPr id="4" name="Footer Placeholder 3"/>
+          <p:cNvSpPr>
+            <a:spLocks noGrp="1"/>
+          </p:cNvSpPr>
+          <p:nvPr>
+            <p:ph type="ftr" sz="quarter" idx="10"/>
+          </p:nvPr>
+        </p:nvSpPr>
+        <p:spPr/>
+        <p:txBody>
+          <a:bodyPr/>
+          <a:lstStyle/>
+          <a:p>
+            <a:pPr>
+              <a:defRPr/>
+            </a:pPr>
+            <a:r>
+              <a:rPr lang="en-US" altLang="en-US" dirty="0"/>
+              <a:t>©2018 Steve Simon    http://TheAnalysisFactor.com</a:t>
+            </a:r>
+          </a:p>
+        </p:txBody>
+      </p:sp>
+      <p:sp>
+        <p:nvSpPr>
+          <p:cNvPr id="5" name="Slide Number Placeholder 4"/>
+          <p:cNvSpPr>
+            <a:spLocks noGrp="1"/>
+          </p:cNvSpPr>
+          <p:nvPr>
+            <p:ph type="sldNum" sz="quarter" idx="11"/>
+          </p:nvPr>
+        </p:nvSpPr>
+        <p:spPr/>
+        <p:txBody>
+          <a:bodyPr/>
+          <a:lstStyle/>
+          <a:p>
+            <a:pPr>
+              <a:defRPr/>
+            </a:pPr>
+            <a:endParaRPr lang="en-US"/>
+          </a:p>
+          <a:p>
+            <a:pPr>
+              <a:defRPr/>
+            </a:pPr>
+            <a:fld id="{E9A8CBA3-AA2B-46A6-BFA3-DCEBEAAB3F0A}" type="slidenum">
+              <a:rPr lang="en-US" smtClean="0"/>
+              <a:pPr>
+                <a:defRPr/>
+              </a:pPr>
+              <a:t>57</a:t>
+            </a:fld>
+            <a:endParaRPr lang="en-US"/>
+          </a:p>
+        </p:txBody>
+      </p:sp>
+      <p:pic>
+        <p:nvPicPr>
+          <p:cNvPr id="3" name="Picture 2">
+            <a:extLst>
+              <a:ext uri="{FF2B5EF4-FFF2-40B4-BE49-F238E27FC236}">
+                <a16:creationId xmlns:a16="http://schemas.microsoft.com/office/drawing/2014/main" id="{202D81FF-1DAF-4475-8D72-CE7056EECC6E}"/>
+              </a:ext>
+            </a:extLst>
+          </p:cNvPr>
+          <p:cNvPicPr>
+            <a:picLocks noChangeAspect="1"/>
+          </p:cNvPicPr>
+          <p:nvPr/>
+        </p:nvPicPr>
+        <p:blipFill>
+          <a:blip r:embed="rId2"/>
+          <a:stretch>
+            <a:fillRect/>
+          </a:stretch>
+        </p:blipFill>
+        <p:spPr>
+          <a:xfrm>
+            <a:off x="457714" y="1143285"/>
+            <a:ext cx="8228571" cy="4571429"/>
+          </a:xfrm>
+          <a:prstGeom prst="rect">
+            <a:avLst/>
+          </a:prstGeom>
+        </p:spPr>
+      </p:pic>
+    </p:spTree>
+    <p:extLst>
+      <p:ext uri="{BB962C8B-B14F-4D97-AF65-F5344CB8AC3E}">
+        <p14:creationId xmlns:p14="http://schemas.microsoft.com/office/powerpoint/2010/main" val="2851612302"/>
+      </p:ext>
+    </p:extLst>
+  </p:cSld>
+  <p:clrMapOvr>
+    <a:masterClrMapping/>
+  </p:clrMapOvr>
+</p:sld>
+</file>
+
+<file path=ppt/slides/slide58.xml><?xml version="1.0" encoding="utf-8"?>
+<p:sld xmlns:a="http://schemas.openxmlformats.org/drawingml/2006/main" xmlns:r="http://schemas.openxmlformats.org/officeDocument/2006/relationships" xmlns:p="http://schemas.openxmlformats.org/presentationml/2006/main">
+  <p:cSld>
+    <p:spTree>
+      <p:nvGrpSpPr>
+        <p:cNvPr id="1" name=""/>
+        <p:cNvGrpSpPr/>
+        <p:nvPr/>
+      </p:nvGrpSpPr>
+      <p:grpSpPr>
+        <a:xfrm>
+          <a:off x="0" y="0"/>
+          <a:ext cx="0" cy="0"/>
+          <a:chOff x="0" y="0"/>
+          <a:chExt cx="0" cy="0"/>
+        </a:xfrm>
+      </p:grpSpPr>
+      <p:sp>
+        <p:nvSpPr>
+          <p:cNvPr id="2" name="Title 1"/>
+          <p:cNvSpPr>
+            <a:spLocks noGrp="1"/>
+          </p:cNvSpPr>
+          <p:nvPr>
+            <p:ph type="title"/>
+          </p:nvPr>
+        </p:nvSpPr>
+        <p:spPr/>
+        <p:txBody>
+          <a:bodyPr/>
+          <a:lstStyle/>
+          <a:p>
+            <a:r>
+              <a:rPr lang="en-US" dirty="0"/>
+              <a:t>Conclusion</a:t>
+            </a:r>
+          </a:p>
+        </p:txBody>
+      </p:sp>
+      <p:sp>
+        <p:nvSpPr>
+          <p:cNvPr id="3" name="Text Placeholder 2"/>
+          <p:cNvSpPr>
+            <a:spLocks noGrp="1"/>
+          </p:cNvSpPr>
+          <p:nvPr>
+            <p:ph type="body" idx="1"/>
+          </p:nvPr>
+        </p:nvSpPr>
+        <p:spPr/>
+        <p:txBody>
+          <a:bodyPr/>
+          <a:lstStyle/>
+          <a:p>
+            <a:pPr marL="457200" indent="-457200">
+              <a:buFont typeface="+mj-lt"/>
+              <a:buAutoNum type="arabicPeriod"/>
+            </a:pPr>
+            <a:r>
+              <a:rPr lang="en-US" dirty="0">
+                <a:latin typeface="+mj-lt"/>
+              </a:rPr>
+              <a:t>Steps in a typical survival model</a:t>
+            </a:r>
+          </a:p>
+          <a:p>
+            <a:pPr marL="914400" lvl="1" indent="-457200">
+              <a:buFont typeface="+mj-lt"/>
+              <a:buAutoNum type="alphaLcPeriod"/>
+            </a:pPr>
+            <a:r>
+              <a:rPr lang="en-US" dirty="0">
+                <a:latin typeface="+mj-lt"/>
+              </a:rPr>
+              <a:t>Descriptive statistics</a:t>
+            </a:r>
+          </a:p>
+          <a:p>
+            <a:pPr marL="914400" lvl="1" indent="-457200">
+              <a:buFont typeface="+mj-lt"/>
+              <a:buAutoNum type="alphaLcPeriod"/>
+            </a:pPr>
+            <a:r>
+              <a:rPr lang="en-US" dirty="0">
+                <a:latin typeface="+mj-lt"/>
+              </a:rPr>
+              <a:t>Counts</a:t>
+            </a:r>
+          </a:p>
+          <a:p>
+            <a:pPr marL="914400" lvl="1" indent="-457200">
+              <a:buFont typeface="+mj-lt"/>
+              <a:buAutoNum type="alphaLcPeriod"/>
+            </a:pPr>
+            <a:r>
+              <a:rPr lang="en-US" dirty="0">
+                <a:latin typeface="+mj-lt"/>
+              </a:rPr>
+              <a:t>Simple Kaplan-Meier curves</a:t>
+            </a:r>
+          </a:p>
+          <a:p>
+            <a:pPr marL="914400" lvl="1" indent="-457200">
+              <a:buFont typeface="+mj-lt"/>
+              <a:buAutoNum type="alphaLcPeriod"/>
+            </a:pPr>
+            <a:r>
+              <a:rPr lang="en-US" dirty="0">
+                <a:latin typeface="+mj-lt"/>
+              </a:rPr>
+              <a:t>Univariate Cox models</a:t>
+            </a:r>
+          </a:p>
+          <a:p>
+            <a:pPr marL="914400" lvl="1" indent="-457200">
+              <a:buFont typeface="+mj-lt"/>
+              <a:buAutoNum type="alphaLcPeriod"/>
+            </a:pPr>
+            <a:r>
+              <a:rPr lang="en-US" dirty="0">
+                <a:latin typeface="+mj-lt"/>
+              </a:rPr>
+              <a:t>Multivariate Cox models</a:t>
+            </a:r>
+          </a:p>
+          <a:p>
+            <a:pPr marL="914400" lvl="1" indent="-457200">
+              <a:buFont typeface="+mj-lt"/>
+              <a:buAutoNum type="alphaLcPeriod"/>
+            </a:pPr>
+            <a:r>
+              <a:rPr lang="en-US" dirty="0">
+                <a:latin typeface="+mj-lt"/>
+              </a:rPr>
+              <a:t>Martingale residuals</a:t>
+            </a:r>
+          </a:p>
+          <a:p>
+            <a:pPr marL="914400" lvl="1" indent="-457200">
+              <a:buFont typeface="+mj-lt"/>
+              <a:buAutoNum type="alphaLcPeriod"/>
+            </a:pPr>
+            <a:r>
+              <a:rPr lang="en-US" dirty="0">
+                <a:latin typeface="+mj-lt"/>
+              </a:rPr>
+              <a:t>Schoenfeld residuals</a:t>
+            </a:r>
+          </a:p>
+          <a:p>
+            <a:pPr marL="457200" indent="-457200">
+              <a:buFont typeface="+mj-lt"/>
+              <a:buAutoNum type="arabicPeriod"/>
+            </a:pPr>
+            <a:r>
+              <a:rPr lang="en-US" dirty="0">
+                <a:latin typeface="+mj-lt"/>
+              </a:rPr>
+              <a:t>Competing </a:t>
+            </a:r>
+            <a:r>
+              <a:rPr lang="en-US">
+                <a:latin typeface="+mj-lt"/>
+              </a:rPr>
+              <a:t>risk analysis</a:t>
+            </a:r>
+            <a:endParaRPr lang="en-US" dirty="0">
+              <a:latin typeface="+mj-lt"/>
+            </a:endParaRPr>
+          </a:p>
+        </p:txBody>
+      </p:sp>
+      <p:sp>
+        <p:nvSpPr>
+          <p:cNvPr id="4" name="Footer Placeholder 3"/>
+          <p:cNvSpPr>
+            <a:spLocks noGrp="1"/>
+          </p:cNvSpPr>
+          <p:nvPr>
+            <p:ph type="ftr" sz="quarter" idx="10"/>
+          </p:nvPr>
+        </p:nvSpPr>
+        <p:spPr/>
+        <p:txBody>
+          <a:bodyPr/>
+          <a:lstStyle/>
+          <a:p>
+            <a:pPr>
+              <a:defRPr/>
+            </a:pPr>
+            <a:r>
+              <a:rPr lang="en-US" altLang="en-US" dirty="0"/>
+              <a:t>©2018 Steve Simon    http://TheAnalysisFactor.com</a:t>
+            </a:r>
+          </a:p>
+        </p:txBody>
+      </p:sp>
+      <p:sp>
+        <p:nvSpPr>
+          <p:cNvPr id="5" name="Slide Number Placeholder 4"/>
+          <p:cNvSpPr>
+            <a:spLocks noGrp="1"/>
+          </p:cNvSpPr>
+          <p:nvPr>
+            <p:ph type="sldNum" sz="quarter" idx="11"/>
+          </p:nvPr>
+        </p:nvSpPr>
+        <p:spPr/>
+        <p:txBody>
+          <a:bodyPr/>
+          <a:lstStyle/>
+          <a:p>
+            <a:pPr>
+              <a:defRPr/>
+            </a:pPr>
+            <a:endParaRPr lang="en-US"/>
+          </a:p>
+          <a:p>
+            <a:pPr>
+              <a:defRPr/>
+            </a:pPr>
+            <a:fld id="{E9A8CBA3-AA2B-46A6-BFA3-DCEBEAAB3F0A}" type="slidenum">
+              <a:rPr lang="en-US" smtClean="0"/>
+              <a:pPr>
+                <a:defRPr/>
+              </a:pPr>
+              <a:t>58</a:t>
             </a:fld>
             <a:endParaRPr lang="en-US"/>
           </a:p>

</xml_diff>

<commit_message>
Added population averaging to supplement-8.
</commit_message>
<xml_diff>
--- a/bin/survival lecture 8.pptx
+++ b/bin/survival lecture 8.pptx
@@ -385,7 +385,7 @@
               <a:pPr>
                 <a:defRPr/>
               </a:pPr>
-              <a:t>6/18/2018</a:t>
+              <a:t>6/19/2018</a:t>
             </a:fld>
             <a:endParaRPr lang="en-US" altLang="en-US"/>
           </a:p>
@@ -693,7 +693,7 @@
               <a:pPr>
                 <a:defRPr/>
               </a:pPr>
-              <a:t>6/18/2018</a:t>
+              <a:t>6/19/2018</a:t>
             </a:fld>
             <a:endParaRPr lang="en-US" altLang="en-US"/>
           </a:p>
@@ -12436,7 +12436,15 @@
           <a:p>
             <a:r>
               <a:rPr lang="en-US" dirty="0"/>
-              <a:t>The leader data set, competing risks</a:t>
+              <a:t>Subgroup </a:t>
+            </a:r>
+            <a:r>
+              <a:rPr lang="en-US" dirty="0" err="1"/>
+              <a:t>nonconstitutional</a:t>
+            </a:r>
+            <a:r>
+              <a:rPr lang="en-US" dirty="0"/>
+              <a:t> ascent</a:t>
             </a:r>
           </a:p>
         </p:txBody>

</xml_diff>